<commit_message>
As suggested, added explanation for acceptance criteria
</commit_message>
<xml_diff>
--- a/Persisting and Predicting Cryptocurrency Data_Final.pptx
+++ b/Persisting and Predicting Cryptocurrency Data_Final.pptx
@@ -274,6 +274,11 @@
       </a:defRPr>
     </a:lvl9pPr>
   </p:defaultTextStyle>
+  <p:extLst>
+    <p:ext uri="{EFAFB233-063F-42B5-8137-9DF3F51BA10A}">
+      <p15:sldGuideLst xmlns:p15="http://schemas.microsoft.com/office/powerpoint/2012/main"/>
+    </p:ext>
+  </p:extLst>
 </p:presentation>
 </file>
 
@@ -1409,8 +1414,8 @@
         </p:nvSpPr>
         <p:spPr>
           <a:xfrm>
-            <a:off x="1143225" y="685800"/>
-            <a:ext cx="4572300" cy="3429000"/>
+            <a:off x="381000" y="685800"/>
+            <a:ext cx="6096000" cy="3429000"/>
           </a:xfrm>
           <a:custGeom>
             <a:avLst/>
@@ -20757,10 +20762,10 @@
               <a:buChar char="•"/>
             </a:pPr>
             <a:r>
-              <a:rPr lang="en-US"/>
+              <a:rPr lang="en-US" dirty="0"/>
               <a:t>90% of the data should be used for analysis - done</a:t>
             </a:r>
-            <a:endParaRPr/>
+            <a:endParaRPr dirty="0"/>
           </a:p>
           <a:p>
             <a:pPr marL="285750" lvl="0" indent="-285750" algn="l" rtl="0">
@@ -20774,10 +20779,10 @@
               <a:buChar char="•"/>
             </a:pPr>
             <a:r>
-              <a:rPr lang="en-US"/>
-              <a:t>A prediction accuracy of &gt;75% - through AIC curve:  </a:t>
+              <a:rPr lang="en-US" dirty="0"/>
+              <a:t>Being a time-series model for real-time data, achieve AIC to be less than 6000:  Achieved AIC of 5151.55 and forecasted predictions for next 15 days.</a:t>
             </a:r>
-            <a:endParaRPr/>
+            <a:endParaRPr dirty="0"/>
           </a:p>
           <a:p>
             <a:pPr marL="285750" lvl="0" indent="-285750" algn="l" rtl="0">
@@ -20791,10 +20796,10 @@
               <a:buChar char="•"/>
             </a:pPr>
             <a:r>
-              <a:rPr lang="en-US"/>
+              <a:rPr lang="en-US" dirty="0"/>
               <a:t>Spark queries should be executed within 5- 10 seconds</a:t>
             </a:r>
-            <a:endParaRPr/>
+            <a:endParaRPr dirty="0"/>
           </a:p>
           <a:p>
             <a:pPr marL="285750" lvl="0" indent="-285750" algn="l" rtl="0">
@@ -20808,10 +20813,10 @@
               <a:buChar char="•"/>
             </a:pPr>
             <a:r>
-              <a:rPr lang="en-US"/>
+              <a:rPr lang="en-US" dirty="0"/>
               <a:t>Configuration criteria: Planning to set the retention policy to 3 minutes to avoid the disk space issue</a:t>
             </a:r>
-            <a:endParaRPr/>
+            <a:endParaRPr dirty="0"/>
           </a:p>
         </p:txBody>
       </p:sp>

</xml_diff>